<commit_message>
Add palloc figures and scripts
Also added palloc-setup.sh, which is used to enable PALLOC.
</commit_message>
<xml_diff>
--- a/paper/figs/architecture.pptx
+++ b/paper/figs/architecture.pptx
@@ -165,10 +165,9 @@
           </a:lstStyle>
           <a:p>
             <a:r>
-              <a:rPr lang="en-US" smtClean="0"/>
+              <a:rPr lang="en-US"/>
               <a:t>Click to edit Master title style</a:t>
             </a:r>
-            <a:endParaRPr lang="en-US"/>
           </a:p>
         </p:txBody>
       </p:sp>
@@ -230,10 +229,9 @@
           </a:lstStyle>
           <a:p>
             <a:r>
-              <a:rPr lang="en-US" smtClean="0"/>
+              <a:rPr lang="en-US"/>
               <a:t>Click to edit Master subtitle style</a:t>
             </a:r>
-            <a:endParaRPr lang="en-US"/>
           </a:p>
         </p:txBody>
       </p:sp>
@@ -254,7 +252,7 @@
           <a:p>
             <a:fld id="{AFC9EDD0-8F38-4BCB-8BCC-AA49DAC7798A}" type="datetimeFigureOut">
               <a:rPr lang="en-US" smtClean="0"/>
-              <a:t>10/1/2017</a:t>
+              <a:t>1/16/2018</a:t>
             </a:fld>
             <a:endParaRPr lang="en-US"/>
           </a:p>
@@ -348,10 +346,9 @@
           <a:lstStyle/>
           <a:p>
             <a:r>
-              <a:rPr lang="en-US" smtClean="0"/>
+              <a:rPr lang="en-US"/>
               <a:t>Click to edit Master title style</a:t>
             </a:r>
-            <a:endParaRPr lang="en-US"/>
           </a:p>
         </p:txBody>
       </p:sp>
@@ -372,38 +369,37 @@
           <a:p>
             <a:pPr lvl="0"/>
             <a:r>
-              <a:rPr lang="en-US" smtClean="0"/>
+              <a:rPr lang="en-US"/>
               <a:t>Edit Master text styles</a:t>
             </a:r>
           </a:p>
           <a:p>
             <a:pPr lvl="1"/>
             <a:r>
-              <a:rPr lang="en-US" smtClean="0"/>
+              <a:rPr lang="en-US"/>
               <a:t>Second level</a:t>
             </a:r>
           </a:p>
           <a:p>
             <a:pPr lvl="2"/>
             <a:r>
-              <a:rPr lang="en-US" smtClean="0"/>
+              <a:rPr lang="en-US"/>
               <a:t>Third level</a:t>
             </a:r>
           </a:p>
           <a:p>
             <a:pPr lvl="3"/>
             <a:r>
-              <a:rPr lang="en-US" smtClean="0"/>
+              <a:rPr lang="en-US"/>
               <a:t>Fourth level</a:t>
             </a:r>
           </a:p>
           <a:p>
             <a:pPr lvl="4"/>
             <a:r>
-              <a:rPr lang="en-US" smtClean="0"/>
+              <a:rPr lang="en-US"/>
               <a:t>Fifth level</a:t>
             </a:r>
-            <a:endParaRPr lang="en-US"/>
           </a:p>
         </p:txBody>
       </p:sp>
@@ -424,7 +420,7 @@
           <a:p>
             <a:fld id="{AFC9EDD0-8F38-4BCB-8BCC-AA49DAC7798A}" type="datetimeFigureOut">
               <a:rPr lang="en-US" smtClean="0"/>
-              <a:t>10/1/2017</a:t>
+              <a:t>1/16/2018</a:t>
             </a:fld>
             <a:endParaRPr lang="en-US"/>
           </a:p>
@@ -523,10 +519,9 @@
           <a:lstStyle/>
           <a:p>
             <a:r>
-              <a:rPr lang="en-US" smtClean="0"/>
+              <a:rPr lang="en-US"/>
               <a:t>Click to edit Master title style</a:t>
             </a:r>
-            <a:endParaRPr lang="en-US"/>
           </a:p>
         </p:txBody>
       </p:sp>
@@ -552,38 +547,37 @@
           <a:p>
             <a:pPr lvl="0"/>
             <a:r>
-              <a:rPr lang="en-US" smtClean="0"/>
+              <a:rPr lang="en-US"/>
               <a:t>Edit Master text styles</a:t>
             </a:r>
           </a:p>
           <a:p>
             <a:pPr lvl="1"/>
             <a:r>
-              <a:rPr lang="en-US" smtClean="0"/>
+              <a:rPr lang="en-US"/>
               <a:t>Second level</a:t>
             </a:r>
           </a:p>
           <a:p>
             <a:pPr lvl="2"/>
             <a:r>
-              <a:rPr lang="en-US" smtClean="0"/>
+              <a:rPr lang="en-US"/>
               <a:t>Third level</a:t>
             </a:r>
           </a:p>
           <a:p>
             <a:pPr lvl="3"/>
             <a:r>
-              <a:rPr lang="en-US" smtClean="0"/>
+              <a:rPr lang="en-US"/>
               <a:t>Fourth level</a:t>
             </a:r>
           </a:p>
           <a:p>
             <a:pPr lvl="4"/>
             <a:r>
-              <a:rPr lang="en-US" smtClean="0"/>
+              <a:rPr lang="en-US"/>
               <a:t>Fifth level</a:t>
             </a:r>
-            <a:endParaRPr lang="en-US"/>
           </a:p>
         </p:txBody>
       </p:sp>
@@ -604,7 +598,7 @@
           <a:p>
             <a:fld id="{AFC9EDD0-8F38-4BCB-8BCC-AA49DAC7798A}" type="datetimeFigureOut">
               <a:rPr lang="en-US" smtClean="0"/>
-              <a:t>10/1/2017</a:t>
+              <a:t>1/16/2018</a:t>
             </a:fld>
             <a:endParaRPr lang="en-US"/>
           </a:p>
@@ -698,10 +692,9 @@
           <a:lstStyle/>
           <a:p>
             <a:r>
-              <a:rPr lang="en-US" smtClean="0"/>
+              <a:rPr lang="en-US"/>
               <a:t>Click to edit Master title style</a:t>
             </a:r>
-            <a:endParaRPr lang="en-US"/>
           </a:p>
         </p:txBody>
       </p:sp>
@@ -722,38 +715,37 @@
           <a:p>
             <a:pPr lvl="0"/>
             <a:r>
-              <a:rPr lang="en-US" smtClean="0"/>
+              <a:rPr lang="en-US"/>
               <a:t>Edit Master text styles</a:t>
             </a:r>
           </a:p>
           <a:p>
             <a:pPr lvl="1"/>
             <a:r>
-              <a:rPr lang="en-US" smtClean="0"/>
+              <a:rPr lang="en-US"/>
               <a:t>Second level</a:t>
             </a:r>
           </a:p>
           <a:p>
             <a:pPr lvl="2"/>
             <a:r>
-              <a:rPr lang="en-US" smtClean="0"/>
+              <a:rPr lang="en-US"/>
               <a:t>Third level</a:t>
             </a:r>
           </a:p>
           <a:p>
             <a:pPr lvl="3"/>
             <a:r>
-              <a:rPr lang="en-US" smtClean="0"/>
+              <a:rPr lang="en-US"/>
               <a:t>Fourth level</a:t>
             </a:r>
           </a:p>
           <a:p>
             <a:pPr lvl="4"/>
             <a:r>
-              <a:rPr lang="en-US" smtClean="0"/>
+              <a:rPr lang="en-US"/>
               <a:t>Fifth level</a:t>
             </a:r>
-            <a:endParaRPr lang="en-US"/>
           </a:p>
         </p:txBody>
       </p:sp>
@@ -774,7 +766,7 @@
           <a:p>
             <a:fld id="{AFC9EDD0-8F38-4BCB-8BCC-AA49DAC7798A}" type="datetimeFigureOut">
               <a:rPr lang="en-US" smtClean="0"/>
-              <a:t>10/1/2017</a:t>
+              <a:t>1/16/2018</a:t>
             </a:fld>
             <a:endParaRPr lang="en-US"/>
           </a:p>
@@ -877,10 +869,9 @@
           </a:lstStyle>
           <a:p>
             <a:r>
-              <a:rPr lang="en-US" smtClean="0"/>
+              <a:rPr lang="en-US"/>
               <a:t>Click to edit Master title style</a:t>
             </a:r>
-            <a:endParaRPr lang="en-US"/>
           </a:p>
         </p:txBody>
       </p:sp>
@@ -997,7 +988,7 @@
           <a:p>
             <a:pPr lvl="0"/>
             <a:r>
-              <a:rPr lang="en-US" smtClean="0"/>
+              <a:rPr lang="en-US"/>
               <a:t>Edit Master text styles</a:t>
             </a:r>
           </a:p>
@@ -1020,7 +1011,7 @@
           <a:p>
             <a:fld id="{AFC9EDD0-8F38-4BCB-8BCC-AA49DAC7798A}" type="datetimeFigureOut">
               <a:rPr lang="en-US" smtClean="0"/>
-              <a:t>10/1/2017</a:t>
+              <a:t>1/16/2018</a:t>
             </a:fld>
             <a:endParaRPr lang="en-US"/>
           </a:p>
@@ -1114,10 +1105,9 @@
           <a:lstStyle/>
           <a:p>
             <a:r>
-              <a:rPr lang="en-US" smtClean="0"/>
+              <a:rPr lang="en-US"/>
               <a:t>Click to edit Master title style</a:t>
             </a:r>
-            <a:endParaRPr lang="en-US"/>
           </a:p>
         </p:txBody>
       </p:sp>
@@ -1143,38 +1133,37 @@
           <a:p>
             <a:pPr lvl="0"/>
             <a:r>
-              <a:rPr lang="en-US" smtClean="0"/>
+              <a:rPr lang="en-US"/>
               <a:t>Edit Master text styles</a:t>
             </a:r>
           </a:p>
           <a:p>
             <a:pPr lvl="1"/>
             <a:r>
-              <a:rPr lang="en-US" smtClean="0"/>
+              <a:rPr lang="en-US"/>
               <a:t>Second level</a:t>
             </a:r>
           </a:p>
           <a:p>
             <a:pPr lvl="2"/>
             <a:r>
-              <a:rPr lang="en-US" smtClean="0"/>
+              <a:rPr lang="en-US"/>
               <a:t>Third level</a:t>
             </a:r>
           </a:p>
           <a:p>
             <a:pPr lvl="3"/>
             <a:r>
-              <a:rPr lang="en-US" smtClean="0"/>
+              <a:rPr lang="en-US"/>
               <a:t>Fourth level</a:t>
             </a:r>
           </a:p>
           <a:p>
             <a:pPr lvl="4"/>
             <a:r>
-              <a:rPr lang="en-US" smtClean="0"/>
+              <a:rPr lang="en-US"/>
               <a:t>Fifth level</a:t>
             </a:r>
-            <a:endParaRPr lang="en-US"/>
           </a:p>
         </p:txBody>
       </p:sp>
@@ -1200,38 +1189,37 @@
           <a:p>
             <a:pPr lvl="0"/>
             <a:r>
-              <a:rPr lang="en-US" smtClean="0"/>
+              <a:rPr lang="en-US"/>
               <a:t>Edit Master text styles</a:t>
             </a:r>
           </a:p>
           <a:p>
             <a:pPr lvl="1"/>
             <a:r>
-              <a:rPr lang="en-US" smtClean="0"/>
+              <a:rPr lang="en-US"/>
               <a:t>Second level</a:t>
             </a:r>
           </a:p>
           <a:p>
             <a:pPr lvl="2"/>
             <a:r>
-              <a:rPr lang="en-US" smtClean="0"/>
+              <a:rPr lang="en-US"/>
               <a:t>Third level</a:t>
             </a:r>
           </a:p>
           <a:p>
             <a:pPr lvl="3"/>
             <a:r>
-              <a:rPr lang="en-US" smtClean="0"/>
+              <a:rPr lang="en-US"/>
               <a:t>Fourth level</a:t>
             </a:r>
           </a:p>
           <a:p>
             <a:pPr lvl="4"/>
             <a:r>
-              <a:rPr lang="en-US" smtClean="0"/>
+              <a:rPr lang="en-US"/>
               <a:t>Fifth level</a:t>
             </a:r>
-            <a:endParaRPr lang="en-US"/>
           </a:p>
         </p:txBody>
       </p:sp>
@@ -1252,7 +1240,7 @@
           <a:p>
             <a:fld id="{AFC9EDD0-8F38-4BCB-8BCC-AA49DAC7798A}" type="datetimeFigureOut">
               <a:rPr lang="en-US" smtClean="0"/>
-              <a:t>10/1/2017</a:t>
+              <a:t>1/16/2018</a:t>
             </a:fld>
             <a:endParaRPr lang="en-US"/>
           </a:p>
@@ -1351,10 +1339,9 @@
           <a:lstStyle/>
           <a:p>
             <a:r>
-              <a:rPr lang="en-US" smtClean="0"/>
+              <a:rPr lang="en-US"/>
               <a:t>Click to edit Master title style</a:t>
             </a:r>
-            <a:endParaRPr lang="en-US"/>
           </a:p>
         </p:txBody>
       </p:sp>
@@ -1417,7 +1404,7 @@
           <a:p>
             <a:pPr lvl="0"/>
             <a:r>
-              <a:rPr lang="en-US" smtClean="0"/>
+              <a:rPr lang="en-US"/>
               <a:t>Edit Master text styles</a:t>
             </a:r>
           </a:p>
@@ -1445,38 +1432,37 @@
           <a:p>
             <a:pPr lvl="0"/>
             <a:r>
-              <a:rPr lang="en-US" smtClean="0"/>
+              <a:rPr lang="en-US"/>
               <a:t>Edit Master text styles</a:t>
             </a:r>
           </a:p>
           <a:p>
             <a:pPr lvl="1"/>
             <a:r>
-              <a:rPr lang="en-US" smtClean="0"/>
+              <a:rPr lang="en-US"/>
               <a:t>Second level</a:t>
             </a:r>
           </a:p>
           <a:p>
             <a:pPr lvl="2"/>
             <a:r>
-              <a:rPr lang="en-US" smtClean="0"/>
+              <a:rPr lang="en-US"/>
               <a:t>Third level</a:t>
             </a:r>
           </a:p>
           <a:p>
             <a:pPr lvl="3"/>
             <a:r>
-              <a:rPr lang="en-US" smtClean="0"/>
+              <a:rPr lang="en-US"/>
               <a:t>Fourth level</a:t>
             </a:r>
           </a:p>
           <a:p>
             <a:pPr lvl="4"/>
             <a:r>
-              <a:rPr lang="en-US" smtClean="0"/>
+              <a:rPr lang="en-US"/>
               <a:t>Fifth level</a:t>
             </a:r>
-            <a:endParaRPr lang="en-US"/>
           </a:p>
         </p:txBody>
       </p:sp>
@@ -1539,7 +1525,7 @@
           <a:p>
             <a:pPr lvl="0"/>
             <a:r>
-              <a:rPr lang="en-US" smtClean="0"/>
+              <a:rPr lang="en-US"/>
               <a:t>Edit Master text styles</a:t>
             </a:r>
           </a:p>
@@ -1567,38 +1553,37 @@
           <a:p>
             <a:pPr lvl="0"/>
             <a:r>
-              <a:rPr lang="en-US" smtClean="0"/>
+              <a:rPr lang="en-US"/>
               <a:t>Edit Master text styles</a:t>
             </a:r>
           </a:p>
           <a:p>
             <a:pPr lvl="1"/>
             <a:r>
-              <a:rPr lang="en-US" smtClean="0"/>
+              <a:rPr lang="en-US"/>
               <a:t>Second level</a:t>
             </a:r>
           </a:p>
           <a:p>
             <a:pPr lvl="2"/>
             <a:r>
-              <a:rPr lang="en-US" smtClean="0"/>
+              <a:rPr lang="en-US"/>
               <a:t>Third level</a:t>
             </a:r>
           </a:p>
           <a:p>
             <a:pPr lvl="3"/>
             <a:r>
-              <a:rPr lang="en-US" smtClean="0"/>
+              <a:rPr lang="en-US"/>
               <a:t>Fourth level</a:t>
             </a:r>
           </a:p>
           <a:p>
             <a:pPr lvl="4"/>
             <a:r>
-              <a:rPr lang="en-US" smtClean="0"/>
+              <a:rPr lang="en-US"/>
               <a:t>Fifth level</a:t>
             </a:r>
-            <a:endParaRPr lang="en-US"/>
           </a:p>
         </p:txBody>
       </p:sp>
@@ -1619,7 +1604,7 @@
           <a:p>
             <a:fld id="{AFC9EDD0-8F38-4BCB-8BCC-AA49DAC7798A}" type="datetimeFigureOut">
               <a:rPr lang="en-US" smtClean="0"/>
-              <a:t>10/1/2017</a:t>
+              <a:t>1/16/2018</a:t>
             </a:fld>
             <a:endParaRPr lang="en-US"/>
           </a:p>
@@ -1713,10 +1698,9 @@
           <a:lstStyle/>
           <a:p>
             <a:r>
-              <a:rPr lang="en-US" smtClean="0"/>
+              <a:rPr lang="en-US"/>
               <a:t>Click to edit Master title style</a:t>
             </a:r>
-            <a:endParaRPr lang="en-US"/>
           </a:p>
         </p:txBody>
       </p:sp>
@@ -1737,7 +1721,7 @@
           <a:p>
             <a:fld id="{AFC9EDD0-8F38-4BCB-8BCC-AA49DAC7798A}" type="datetimeFigureOut">
               <a:rPr lang="en-US" smtClean="0"/>
-              <a:t>10/1/2017</a:t>
+              <a:t>1/16/2018</a:t>
             </a:fld>
             <a:endParaRPr lang="en-US"/>
           </a:p>
@@ -1832,7 +1816,7 @@
           <a:p>
             <a:fld id="{AFC9EDD0-8F38-4BCB-8BCC-AA49DAC7798A}" type="datetimeFigureOut">
               <a:rPr lang="en-US" smtClean="0"/>
-              <a:t>10/1/2017</a:t>
+              <a:t>1/16/2018</a:t>
             </a:fld>
             <a:endParaRPr lang="en-US"/>
           </a:p>
@@ -1935,10 +1919,9 @@
           </a:lstStyle>
           <a:p>
             <a:r>
-              <a:rPr lang="en-US" smtClean="0"/>
+              <a:rPr lang="en-US"/>
               <a:t>Click to edit Master title style</a:t>
             </a:r>
-            <a:endParaRPr lang="en-US"/>
           </a:p>
         </p:txBody>
       </p:sp>
@@ -1992,38 +1975,37 @@
           <a:p>
             <a:pPr lvl="0"/>
             <a:r>
-              <a:rPr lang="en-US" smtClean="0"/>
+              <a:rPr lang="en-US"/>
               <a:t>Edit Master text styles</a:t>
             </a:r>
           </a:p>
           <a:p>
             <a:pPr lvl="1"/>
             <a:r>
-              <a:rPr lang="en-US" smtClean="0"/>
+              <a:rPr lang="en-US"/>
               <a:t>Second level</a:t>
             </a:r>
           </a:p>
           <a:p>
             <a:pPr lvl="2"/>
             <a:r>
-              <a:rPr lang="en-US" smtClean="0"/>
+              <a:rPr lang="en-US"/>
               <a:t>Third level</a:t>
             </a:r>
           </a:p>
           <a:p>
             <a:pPr lvl="3"/>
             <a:r>
-              <a:rPr lang="en-US" smtClean="0"/>
+              <a:rPr lang="en-US"/>
               <a:t>Fourth level</a:t>
             </a:r>
           </a:p>
           <a:p>
             <a:pPr lvl="4"/>
             <a:r>
-              <a:rPr lang="en-US" smtClean="0"/>
+              <a:rPr lang="en-US"/>
               <a:t>Fifth level</a:t>
             </a:r>
-            <a:endParaRPr lang="en-US"/>
           </a:p>
         </p:txBody>
       </p:sp>
@@ -2086,7 +2068,7 @@
           <a:p>
             <a:pPr lvl="0"/>
             <a:r>
-              <a:rPr lang="en-US" smtClean="0"/>
+              <a:rPr lang="en-US"/>
               <a:t>Edit Master text styles</a:t>
             </a:r>
           </a:p>
@@ -2109,7 +2091,7 @@
           <a:p>
             <a:fld id="{AFC9EDD0-8F38-4BCB-8BCC-AA49DAC7798A}" type="datetimeFigureOut">
               <a:rPr lang="en-US" smtClean="0"/>
-              <a:t>10/1/2017</a:t>
+              <a:t>1/16/2018</a:t>
             </a:fld>
             <a:endParaRPr lang="en-US"/>
           </a:p>
@@ -2212,10 +2194,9 @@
           </a:lstStyle>
           <a:p>
             <a:r>
-              <a:rPr lang="en-US" smtClean="0"/>
+              <a:rPr lang="en-US"/>
               <a:t>Click to edit Master title style</a:t>
             </a:r>
-            <a:endParaRPr lang="en-US"/>
           </a:p>
         </p:txBody>
       </p:sp>
@@ -2339,7 +2320,7 @@
           <a:p>
             <a:pPr lvl="0"/>
             <a:r>
-              <a:rPr lang="en-US" smtClean="0"/>
+              <a:rPr lang="en-US"/>
               <a:t>Edit Master text styles</a:t>
             </a:r>
           </a:p>
@@ -2362,7 +2343,7 @@
           <a:p>
             <a:fld id="{AFC9EDD0-8F38-4BCB-8BCC-AA49DAC7798A}" type="datetimeFigureOut">
               <a:rPr lang="en-US" smtClean="0"/>
-              <a:t>10/1/2017</a:t>
+              <a:t>1/16/2018</a:t>
             </a:fld>
             <a:endParaRPr lang="en-US"/>
           </a:p>
@@ -2471,10 +2452,9 @@
           <a:lstStyle/>
           <a:p>
             <a:r>
-              <a:rPr lang="en-US" smtClean="0"/>
+              <a:rPr lang="en-US"/>
               <a:t>Click to edit Master title style</a:t>
             </a:r>
-            <a:endParaRPr lang="en-US"/>
           </a:p>
         </p:txBody>
       </p:sp>
@@ -2505,38 +2485,37 @@
           <a:p>
             <a:pPr lvl="0"/>
             <a:r>
-              <a:rPr lang="en-US" smtClean="0"/>
+              <a:rPr lang="en-US"/>
               <a:t>Edit Master text styles</a:t>
             </a:r>
           </a:p>
           <a:p>
             <a:pPr lvl="1"/>
             <a:r>
-              <a:rPr lang="en-US" smtClean="0"/>
+              <a:rPr lang="en-US"/>
               <a:t>Second level</a:t>
             </a:r>
           </a:p>
           <a:p>
             <a:pPr lvl="2"/>
             <a:r>
-              <a:rPr lang="en-US" smtClean="0"/>
+              <a:rPr lang="en-US"/>
               <a:t>Third level</a:t>
             </a:r>
           </a:p>
           <a:p>
             <a:pPr lvl="3"/>
             <a:r>
-              <a:rPr lang="en-US" smtClean="0"/>
+              <a:rPr lang="en-US"/>
               <a:t>Fourth level</a:t>
             </a:r>
           </a:p>
           <a:p>
             <a:pPr lvl="4"/>
             <a:r>
-              <a:rPr lang="en-US" smtClean="0"/>
+              <a:rPr lang="en-US"/>
               <a:t>Fifth level</a:t>
             </a:r>
-            <a:endParaRPr lang="en-US"/>
           </a:p>
         </p:txBody>
       </p:sp>
@@ -2575,7 +2554,7 @@
           <a:p>
             <a:fld id="{AFC9EDD0-8F38-4BCB-8BCC-AA49DAC7798A}" type="datetimeFigureOut">
               <a:rPr lang="en-US" smtClean="0"/>
-              <a:t>10/1/2017</a:t>
+              <a:t>1/16/2018</a:t>
             </a:fld>
             <a:endParaRPr lang="en-US"/>
           </a:p>
@@ -3118,10 +3097,9 @@
             <a:p>
               <a:pPr algn="ctr"/>
               <a:r>
-                <a:rPr lang="en-US" sz="1600" dirty="0" smtClean="0"/>
+                <a:rPr lang="en-US" sz="1600" dirty="0"/>
                 <a:t>10 neurons</a:t>
               </a:r>
-              <a:endParaRPr lang="en-US" sz="1600" dirty="0"/>
             </a:p>
           </p:txBody>
         </p:sp>
@@ -3160,10 +3138,9 @@
             <a:p>
               <a:pPr algn="ctr"/>
               <a:r>
-                <a:rPr lang="en-US" sz="1600" dirty="0" smtClean="0"/>
+                <a:rPr lang="en-US" sz="1600" dirty="0"/>
                 <a:t>50 neurons</a:t>
               </a:r>
-              <a:endParaRPr lang="en-US" sz="1600" dirty="0"/>
             </a:p>
           </p:txBody>
         </p:sp>
@@ -3202,10 +3179,9 @@
             <a:p>
               <a:pPr algn="ctr"/>
               <a:r>
-                <a:rPr lang="en-US" sz="1600" dirty="0" smtClean="0"/>
+                <a:rPr lang="en-US" sz="1600" dirty="0"/>
                 <a:t>100 neurons</a:t>
               </a:r>
-              <a:endParaRPr lang="en-US" sz="1600" dirty="0"/>
             </a:p>
           </p:txBody>
         </p:sp>
@@ -3244,10 +3220,9 @@
             <a:p>
               <a:pPr algn="ctr"/>
               <a:r>
-                <a:rPr lang="en-US" sz="1600" dirty="0" smtClean="0"/>
-                <a:t>1164 neurons</a:t>
+                <a:rPr lang="en-US" sz="1600" dirty="0"/>
+                <a:t>1152 neurons</a:t>
               </a:r>
-              <a:endParaRPr lang="en-US" sz="1600" dirty="0"/>
             </a:p>
           </p:txBody>
         </p:sp>
@@ -6207,24 +6182,19 @@
             <a:lstStyle/>
             <a:p>
               <a:r>
-                <a:rPr lang="en-US" b="1" dirty="0" smtClean="0"/>
+                <a:rPr lang="en-US" b="1" dirty="0"/>
                 <a:t>conv1</a:t>
               </a:r>
               <a:r>
-                <a:rPr lang="en-US" dirty="0" smtClean="0"/>
+                <a:rPr lang="en-US" dirty="0"/>
                 <a:t>: 24@31x98</a:t>
               </a:r>
             </a:p>
             <a:p>
               <a:r>
                 <a:rPr lang="en-US" dirty="0"/>
-                <a:t>c</a:t>
+                <a:t>convolutional layer</a:t>
               </a:r>
-              <a:r>
-                <a:rPr lang="en-US" dirty="0" smtClean="0"/>
-                <a:t>onvolutional layer</a:t>
-              </a:r>
-              <a:endParaRPr lang="en-US" dirty="0"/>
             </a:p>
           </p:txBody>
         </p:sp>
@@ -6251,18 +6221,18 @@
             <a:lstStyle/>
             <a:p>
               <a:r>
-                <a:rPr lang="en-US" b="1" dirty="0" smtClean="0"/>
+                <a:rPr lang="en-US" b="1" dirty="0"/>
                 <a:t>conv2</a:t>
               </a:r>
               <a:r>
-                <a:rPr lang="en-US" dirty="0" smtClean="0"/>
+                <a:rPr lang="en-US" dirty="0"/>
                 <a:t>: 36@14x47</a:t>
               </a:r>
               <a:br>
-                <a:rPr lang="en-US" dirty="0" smtClean="0"/>
+                <a:rPr lang="en-US" dirty="0"/>
               </a:br>
               <a:r>
-                <a:rPr lang="en-US" dirty="0" smtClean="0"/>
+                <a:rPr lang="en-US" dirty="0"/>
                 <a:t>convolutional layer</a:t>
               </a:r>
             </a:p>
@@ -6291,21 +6261,20 @@
             <a:lstStyle/>
             <a:p>
               <a:r>
-                <a:rPr lang="en-US" b="1" dirty="0" smtClean="0"/>
+                <a:rPr lang="en-US" b="1" dirty="0"/>
                 <a:t>conv3</a:t>
               </a:r>
               <a:r>
-                <a:rPr lang="en-US" dirty="0" smtClean="0"/>
+                <a:rPr lang="en-US" dirty="0"/>
                 <a:t>: 48@5x22</a:t>
               </a:r>
               <a:br>
-                <a:rPr lang="en-US" dirty="0" smtClean="0"/>
+                <a:rPr lang="en-US" dirty="0"/>
               </a:br>
               <a:r>
-                <a:rPr lang="en-US" dirty="0" smtClean="0"/>
+                <a:rPr lang="en-US" dirty="0"/>
                 <a:t>convolutional layer</a:t>
               </a:r>
-              <a:endParaRPr lang="en-US" dirty="0"/>
             </a:p>
           </p:txBody>
         </p:sp>
@@ -6332,21 +6301,20 @@
             <a:lstStyle/>
             <a:p>
               <a:r>
-                <a:rPr lang="en-US" b="1" dirty="0" smtClean="0"/>
+                <a:rPr lang="en-US" b="1" dirty="0"/>
                 <a:t>conv4</a:t>
               </a:r>
               <a:r>
-                <a:rPr lang="en-US" dirty="0" smtClean="0"/>
+                <a:rPr lang="en-US" dirty="0"/>
                 <a:t>: 64@3x20</a:t>
               </a:r>
               <a:br>
-                <a:rPr lang="en-US" dirty="0" smtClean="0"/>
+                <a:rPr lang="en-US" dirty="0"/>
               </a:br>
               <a:r>
-                <a:rPr lang="en-US" dirty="0" smtClean="0"/>
+                <a:rPr lang="en-US" dirty="0"/>
                 <a:t>convolutional layer</a:t>
               </a:r>
-              <a:endParaRPr lang="en-US" dirty="0"/>
             </a:p>
           </p:txBody>
         </p:sp>
@@ -6373,21 +6341,20 @@
             <a:lstStyle/>
             <a:p>
               <a:r>
-                <a:rPr lang="en-US" b="1" dirty="0" smtClean="0"/>
+                <a:rPr lang="en-US" b="1" dirty="0"/>
                 <a:t>conv5</a:t>
               </a:r>
               <a:r>
-                <a:rPr lang="en-US" dirty="0" smtClean="0"/>
+                <a:rPr lang="en-US" dirty="0"/>
                 <a:t>: 64@1x18</a:t>
               </a:r>
               <a:br>
-                <a:rPr lang="en-US" dirty="0" smtClean="0"/>
+                <a:rPr lang="en-US" dirty="0"/>
               </a:br>
               <a:r>
-                <a:rPr lang="en-US" dirty="0" smtClean="0"/>
+                <a:rPr lang="en-US" dirty="0"/>
                 <a:t>convolutional layer</a:t>
               </a:r>
-              <a:endParaRPr lang="en-US" dirty="0"/>
             </a:p>
           </p:txBody>
         </p:sp>
@@ -6414,10 +6381,9 @@
             <a:lstStyle/>
             <a:p>
               <a:r>
-                <a:rPr lang="en-US" dirty="0" smtClean="0"/>
+                <a:rPr lang="en-US" dirty="0"/>
                 <a:t>input: 200x66 RGB pixels</a:t>
               </a:r>
-              <a:endParaRPr lang="en-US" dirty="0"/>
             </a:p>
           </p:txBody>
         </p:sp>
@@ -6444,51 +6410,43 @@
             <a:lstStyle/>
             <a:p>
               <a:r>
-                <a:rPr lang="en-US" b="1" dirty="0" smtClean="0"/>
+                <a:rPr lang="en-US" b="1" dirty="0"/>
                 <a:t>fc4</a:t>
               </a:r>
               <a:r>
-                <a:rPr lang="en-US" dirty="0" smtClean="0"/>
+                <a:rPr lang="en-US" dirty="0"/>
                 <a:t>: fully-connected layer</a:t>
               </a:r>
-              <a:endParaRPr lang="en-US" dirty="0" smtClean="0"/>
             </a:p>
             <a:p>
               <a:r>
-                <a:rPr lang="en-US" b="1" dirty="0" smtClean="0"/>
+                <a:rPr lang="en-US" b="1" dirty="0"/>
                 <a:t>fc3</a:t>
               </a:r>
               <a:r>
-                <a:rPr lang="en-US" dirty="0" smtClean="0"/>
+                <a:rPr lang="en-US" dirty="0"/>
                 <a:t>: fully-connected layer</a:t>
               </a:r>
-              <a:endParaRPr lang="en-US" dirty="0" smtClean="0"/>
             </a:p>
             <a:p>
               <a:r>
-                <a:rPr lang="en-US" b="1" dirty="0" smtClean="0"/>
+                <a:rPr lang="en-US" b="1" dirty="0"/>
                 <a:t>fc2</a:t>
               </a:r>
               <a:r>
-                <a:rPr lang="en-US" dirty="0" smtClean="0"/>
-                <a:t>: </a:t>
+                <a:rPr lang="en-US" dirty="0"/>
+                <a:t>: fully-connected layer</a:t>
               </a:r>
-              <a:r>
-                <a:rPr lang="en-US" dirty="0" smtClean="0"/>
-                <a:t>fully-connected layer</a:t>
-              </a:r>
-              <a:endParaRPr lang="en-US" dirty="0" smtClean="0"/>
             </a:p>
             <a:p>
               <a:r>
-                <a:rPr lang="en-US" b="1" dirty="0" smtClean="0"/>
+                <a:rPr lang="en-US" b="1" dirty="0"/>
                 <a:t>fc1</a:t>
               </a:r>
               <a:r>
-                <a:rPr lang="en-US" dirty="0" smtClean="0"/>
+                <a:rPr lang="en-US" dirty="0"/>
                 <a:t>: fully-connected layer</a:t>
               </a:r>
-              <a:endParaRPr lang="en-US" dirty="0"/>
             </a:p>
           </p:txBody>
         </p:sp>
@@ -6852,10 +6810,9 @@
             <a:lstStyle/>
             <a:p>
               <a:r>
-                <a:rPr lang="en-US" dirty="0" smtClean="0"/>
+                <a:rPr lang="en-US" dirty="0"/>
                 <a:t>output: steering angle</a:t>
               </a:r>
-              <a:endParaRPr lang="en-US" dirty="0"/>
             </a:p>
           </p:txBody>
         </p:sp>
@@ -6882,10 +6839,9 @@
             <a:lstStyle/>
             <a:p>
               <a:r>
-                <a:rPr lang="en-US" sz="1600" dirty="0" smtClean="0"/>
+                <a:rPr lang="en-US" sz="1600" dirty="0"/>
                 <a:t>5x5 kernel</a:t>
               </a:r>
-              <a:endParaRPr lang="en-US" sz="1600" dirty="0"/>
             </a:p>
           </p:txBody>
         </p:sp>
@@ -6912,10 +6868,9 @@
             <a:lstStyle/>
             <a:p>
               <a:r>
-                <a:rPr lang="en-US" sz="1600" dirty="0" smtClean="0"/>
+                <a:rPr lang="en-US" sz="1600" dirty="0"/>
                 <a:t>5x5 kernel</a:t>
               </a:r>
-              <a:endParaRPr lang="en-US" sz="1600" dirty="0"/>
             </a:p>
           </p:txBody>
         </p:sp>
@@ -6942,10 +6897,9 @@
             <a:lstStyle/>
             <a:p>
               <a:r>
-                <a:rPr lang="en-US" sz="1600" dirty="0" smtClean="0"/>
+                <a:rPr lang="en-US" sz="1600" dirty="0"/>
                 <a:t>5x5 kernel</a:t>
               </a:r>
-              <a:endParaRPr lang="en-US" sz="1600" dirty="0"/>
             </a:p>
           </p:txBody>
         </p:sp>
@@ -6972,10 +6926,9 @@
             <a:lstStyle/>
             <a:p>
               <a:r>
-                <a:rPr lang="en-US" sz="1600" dirty="0" smtClean="0"/>
+                <a:rPr lang="en-US" sz="1600" dirty="0"/>
                 <a:t>3x3 kernel</a:t>
               </a:r>
-              <a:endParaRPr lang="en-US" sz="1600" dirty="0"/>
             </a:p>
           </p:txBody>
         </p:sp>
@@ -7002,10 +6955,9 @@
             <a:lstStyle/>
             <a:p>
               <a:r>
-                <a:rPr lang="en-US" sz="1600" dirty="0" smtClean="0"/>
+                <a:rPr lang="en-US" sz="1600" dirty="0"/>
                 <a:t>3x3 kernel</a:t>
               </a:r>
-              <a:endParaRPr lang="en-US" sz="1600" dirty="0"/>
             </a:p>
           </p:txBody>
         </p:sp>

</xml_diff>